<commit_message>
added intial designs for peojects
</commit_message>
<xml_diff>
--- a/Book.pptx
+++ b/Book.pptx
@@ -121,6 +121,11 @@
       </a:defRPr>
     </a:lvl9pPr>
   </p:defaultTextStyle>
+  <p:extLst>
+    <p:ext uri="{EFAFB233-063F-42B5-8137-9DF3F51BA10A}">
+      <p15:sldGuideLst xmlns:p15="http://schemas.microsoft.com/office/powerpoint/2012/main"/>
+    </p:ext>
+  </p:extLst>
 </p:presentation>
 </file>
 
@@ -255,7 +260,7 @@
           <a:p>
             <a:fld id="{E28A663F-8D62-47AD-BDE7-BDDB9F5E79E9}" type="datetimeFigureOut">
               <a:rPr lang="en-US" smtClean="0"/>
-              <a:t>6/11/2019</a:t>
+              <a:t>6/12/2019</a:t>
             </a:fld>
             <a:endParaRPr lang="en-US"/>
           </a:p>
@@ -425,7 +430,7 @@
           <a:p>
             <a:fld id="{E28A663F-8D62-47AD-BDE7-BDDB9F5E79E9}" type="datetimeFigureOut">
               <a:rPr lang="en-US" smtClean="0"/>
-              <a:t>6/11/2019</a:t>
+              <a:t>6/12/2019</a:t>
             </a:fld>
             <a:endParaRPr lang="en-US"/>
           </a:p>
@@ -605,7 +610,7 @@
           <a:p>
             <a:fld id="{E28A663F-8D62-47AD-BDE7-BDDB9F5E79E9}" type="datetimeFigureOut">
               <a:rPr lang="en-US" smtClean="0"/>
-              <a:t>6/11/2019</a:t>
+              <a:t>6/12/2019</a:t>
             </a:fld>
             <a:endParaRPr lang="en-US"/>
           </a:p>
@@ -775,7 +780,7 @@
           <a:p>
             <a:fld id="{E28A663F-8D62-47AD-BDE7-BDDB9F5E79E9}" type="datetimeFigureOut">
               <a:rPr lang="en-US" smtClean="0"/>
-              <a:t>6/11/2019</a:t>
+              <a:t>6/12/2019</a:t>
             </a:fld>
             <a:endParaRPr lang="en-US"/>
           </a:p>
@@ -1019,7 +1024,7 @@
           <a:p>
             <a:fld id="{E28A663F-8D62-47AD-BDE7-BDDB9F5E79E9}" type="datetimeFigureOut">
               <a:rPr lang="en-US" smtClean="0"/>
-              <a:t>6/11/2019</a:t>
+              <a:t>6/12/2019</a:t>
             </a:fld>
             <a:endParaRPr lang="en-US"/>
           </a:p>
@@ -1251,7 +1256,7 @@
           <a:p>
             <a:fld id="{E28A663F-8D62-47AD-BDE7-BDDB9F5E79E9}" type="datetimeFigureOut">
               <a:rPr lang="en-US" smtClean="0"/>
-              <a:t>6/11/2019</a:t>
+              <a:t>6/12/2019</a:t>
             </a:fld>
             <a:endParaRPr lang="en-US"/>
           </a:p>
@@ -1618,7 +1623,7 @@
           <a:p>
             <a:fld id="{E28A663F-8D62-47AD-BDE7-BDDB9F5E79E9}" type="datetimeFigureOut">
               <a:rPr lang="en-US" smtClean="0"/>
-              <a:t>6/11/2019</a:t>
+              <a:t>6/12/2019</a:t>
             </a:fld>
             <a:endParaRPr lang="en-US"/>
           </a:p>
@@ -1736,7 +1741,7 @@
           <a:p>
             <a:fld id="{E28A663F-8D62-47AD-BDE7-BDDB9F5E79E9}" type="datetimeFigureOut">
               <a:rPr lang="en-US" smtClean="0"/>
-              <a:t>6/11/2019</a:t>
+              <a:t>6/12/2019</a:t>
             </a:fld>
             <a:endParaRPr lang="en-US"/>
           </a:p>
@@ -1831,7 +1836,7 @@
           <a:p>
             <a:fld id="{E28A663F-8D62-47AD-BDE7-BDDB9F5E79E9}" type="datetimeFigureOut">
               <a:rPr lang="en-US" smtClean="0"/>
-              <a:t>6/11/2019</a:t>
+              <a:t>6/12/2019</a:t>
             </a:fld>
             <a:endParaRPr lang="en-US"/>
           </a:p>
@@ -2108,7 +2113,7 @@
           <a:p>
             <a:fld id="{E28A663F-8D62-47AD-BDE7-BDDB9F5E79E9}" type="datetimeFigureOut">
               <a:rPr lang="en-US" smtClean="0"/>
-              <a:t>6/11/2019</a:t>
+              <a:t>6/12/2019</a:t>
             </a:fld>
             <a:endParaRPr lang="en-US"/>
           </a:p>
@@ -2365,7 +2370,7 @@
           <a:p>
             <a:fld id="{E28A663F-8D62-47AD-BDE7-BDDB9F5E79E9}" type="datetimeFigureOut">
               <a:rPr lang="en-US" smtClean="0"/>
-              <a:t>6/11/2019</a:t>
+              <a:t>6/12/2019</a:t>
             </a:fld>
             <a:endParaRPr lang="en-US"/>
           </a:p>
@@ -2578,7 +2583,7 @@
           <a:p>
             <a:fld id="{E28A663F-8D62-47AD-BDE7-BDDB9F5E79E9}" type="datetimeFigureOut">
               <a:rPr lang="en-US" smtClean="0"/>
-              <a:t>6/11/2019</a:t>
+              <a:t>6/12/2019</a:t>
             </a:fld>
             <a:endParaRPr lang="en-US"/>
           </a:p>
@@ -3981,8 +3986,8 @@
         </p:nvSpPr>
         <p:spPr>
           <a:xfrm>
-            <a:off x="419100" y="380137"/>
-            <a:ext cx="5905500" cy="1239113"/>
+            <a:off x="233464" y="252919"/>
+            <a:ext cx="6091136" cy="1200329"/>
           </a:xfrm>
           <a:prstGeom prst="rect">
             <a:avLst/>
@@ -4042,7 +4047,7 @@
         </p:blipFill>
         <p:spPr>
           <a:xfrm>
-            <a:off x="0" y="4202907"/>
+            <a:off x="0" y="2252663"/>
             <a:ext cx="3774990" cy="2909888"/>
           </a:xfrm>
           <a:prstGeom prst="rect">
@@ -4203,8 +4208,8 @@
         </p:blipFill>
         <p:spPr>
           <a:xfrm>
-            <a:off x="114756" y="6035274"/>
-            <a:ext cx="3866694" cy="3870726"/>
+            <a:off x="4144418" y="4830426"/>
+            <a:ext cx="2713582" cy="2716412"/>
           </a:xfrm>
           <a:prstGeom prst="rect">
             <a:avLst/>
@@ -4233,7 +4238,7 @@
         </p:blipFill>
         <p:spPr>
           <a:xfrm>
-            <a:off x="0" y="3024187"/>
+            <a:off x="0" y="2245251"/>
             <a:ext cx="4438650" cy="2496741"/>
           </a:xfrm>
           <a:prstGeom prst="rect">
@@ -4263,7 +4268,7 @@
         </p:blipFill>
         <p:spPr>
           <a:xfrm>
-            <a:off x="2587842" y="5405556"/>
+            <a:off x="2587842" y="7504036"/>
             <a:ext cx="4270158" cy="2401964"/>
           </a:xfrm>
           <a:prstGeom prst="rect">
@@ -4293,7 +4298,7 @@
         </p:blipFill>
         <p:spPr>
           <a:xfrm>
-            <a:off x="3333750" y="737235"/>
+            <a:off x="3212297" y="520053"/>
             <a:ext cx="3524250" cy="1982391"/>
           </a:xfrm>
           <a:prstGeom prst="rect">

</xml_diff>

<commit_message>
added pics and wrote the contents
</commit_message>
<xml_diff>
--- a/Book.pptx
+++ b/Book.pptx
@@ -260,7 +260,7 @@
           <a:p>
             <a:fld id="{E28A663F-8D62-47AD-BDE7-BDDB9F5E79E9}" type="datetimeFigureOut">
               <a:rPr lang="en-US" smtClean="0"/>
-              <a:t>6/12/2019</a:t>
+              <a:t>6/13/2019</a:t>
             </a:fld>
             <a:endParaRPr lang="en-US"/>
           </a:p>
@@ -430,7 +430,7 @@
           <a:p>
             <a:fld id="{E28A663F-8D62-47AD-BDE7-BDDB9F5E79E9}" type="datetimeFigureOut">
               <a:rPr lang="en-US" smtClean="0"/>
-              <a:t>6/12/2019</a:t>
+              <a:t>6/13/2019</a:t>
             </a:fld>
             <a:endParaRPr lang="en-US"/>
           </a:p>
@@ -610,7 +610,7 @@
           <a:p>
             <a:fld id="{E28A663F-8D62-47AD-BDE7-BDDB9F5E79E9}" type="datetimeFigureOut">
               <a:rPr lang="en-US" smtClean="0"/>
-              <a:t>6/12/2019</a:t>
+              <a:t>6/13/2019</a:t>
             </a:fld>
             <a:endParaRPr lang="en-US"/>
           </a:p>
@@ -780,7 +780,7 @@
           <a:p>
             <a:fld id="{E28A663F-8D62-47AD-BDE7-BDDB9F5E79E9}" type="datetimeFigureOut">
               <a:rPr lang="en-US" smtClean="0"/>
-              <a:t>6/12/2019</a:t>
+              <a:t>6/13/2019</a:t>
             </a:fld>
             <a:endParaRPr lang="en-US"/>
           </a:p>
@@ -1024,7 +1024,7 @@
           <a:p>
             <a:fld id="{E28A663F-8D62-47AD-BDE7-BDDB9F5E79E9}" type="datetimeFigureOut">
               <a:rPr lang="en-US" smtClean="0"/>
-              <a:t>6/12/2019</a:t>
+              <a:t>6/13/2019</a:t>
             </a:fld>
             <a:endParaRPr lang="en-US"/>
           </a:p>
@@ -1256,7 +1256,7 @@
           <a:p>
             <a:fld id="{E28A663F-8D62-47AD-BDE7-BDDB9F5E79E9}" type="datetimeFigureOut">
               <a:rPr lang="en-US" smtClean="0"/>
-              <a:t>6/12/2019</a:t>
+              <a:t>6/13/2019</a:t>
             </a:fld>
             <a:endParaRPr lang="en-US"/>
           </a:p>
@@ -1623,7 +1623,7 @@
           <a:p>
             <a:fld id="{E28A663F-8D62-47AD-BDE7-BDDB9F5E79E9}" type="datetimeFigureOut">
               <a:rPr lang="en-US" smtClean="0"/>
-              <a:t>6/12/2019</a:t>
+              <a:t>6/13/2019</a:t>
             </a:fld>
             <a:endParaRPr lang="en-US"/>
           </a:p>
@@ -1741,7 +1741,7 @@
           <a:p>
             <a:fld id="{E28A663F-8D62-47AD-BDE7-BDDB9F5E79E9}" type="datetimeFigureOut">
               <a:rPr lang="en-US" smtClean="0"/>
-              <a:t>6/12/2019</a:t>
+              <a:t>6/13/2019</a:t>
             </a:fld>
             <a:endParaRPr lang="en-US"/>
           </a:p>
@@ -1836,7 +1836,7 @@
           <a:p>
             <a:fld id="{E28A663F-8D62-47AD-BDE7-BDDB9F5E79E9}" type="datetimeFigureOut">
               <a:rPr lang="en-US" smtClean="0"/>
-              <a:t>6/12/2019</a:t>
+              <a:t>6/13/2019</a:t>
             </a:fld>
             <a:endParaRPr lang="en-US"/>
           </a:p>
@@ -2113,7 +2113,7 @@
           <a:p>
             <a:fld id="{E28A663F-8D62-47AD-BDE7-BDDB9F5E79E9}" type="datetimeFigureOut">
               <a:rPr lang="en-US" smtClean="0"/>
-              <a:t>6/12/2019</a:t>
+              <a:t>6/13/2019</a:t>
             </a:fld>
             <a:endParaRPr lang="en-US"/>
           </a:p>
@@ -2370,7 +2370,7 @@
           <a:p>
             <a:fld id="{E28A663F-8D62-47AD-BDE7-BDDB9F5E79E9}" type="datetimeFigureOut">
               <a:rPr lang="en-US" smtClean="0"/>
-              <a:t>6/12/2019</a:t>
+              <a:t>6/13/2019</a:t>
             </a:fld>
             <a:endParaRPr lang="en-US"/>
           </a:p>
@@ -2583,7 +2583,7 @@
           <a:p>
             <a:fld id="{E28A663F-8D62-47AD-BDE7-BDDB9F5E79E9}" type="datetimeFigureOut">
               <a:rPr lang="en-US" smtClean="0"/>
-              <a:t>6/12/2019</a:t>
+              <a:t>6/13/2019</a:t>
             </a:fld>
             <a:endParaRPr lang="en-US"/>
           </a:p>

</xml_diff>